<commit_message>
docs: Init final report
</commit_message>
<xml_diff>
--- a/docs/nlp_IRun_04.pptx
+++ b/docs/nlp_IRun_04.pptx
@@ -277,7 +277,7 @@
           <a:p>
             <a:fld id="{0DE30E30-8A3F-4C87-9FDC-8C9A3551B329}" type="datetimeFigureOut">
               <a:rPr lang="ko-KR" altLang="en-US" smtClean="0"/>
-              <a:t>2022-05-29</a:t>
+              <a:t>2022-06-13</a:t>
             </a:fld>
             <a:endParaRPr lang="ko-KR" altLang="en-US"/>
           </a:p>
@@ -475,7 +475,7 @@
           <a:p>
             <a:fld id="{0DE30E30-8A3F-4C87-9FDC-8C9A3551B329}" type="datetimeFigureOut">
               <a:rPr lang="ko-KR" altLang="en-US" smtClean="0"/>
-              <a:t>2022-05-29</a:t>
+              <a:t>2022-06-13</a:t>
             </a:fld>
             <a:endParaRPr lang="ko-KR" altLang="en-US"/>
           </a:p>
@@ -683,7 +683,7 @@
           <a:p>
             <a:fld id="{0DE30E30-8A3F-4C87-9FDC-8C9A3551B329}" type="datetimeFigureOut">
               <a:rPr lang="ko-KR" altLang="en-US" smtClean="0"/>
-              <a:t>2022-05-29</a:t>
+              <a:t>2022-06-13</a:t>
             </a:fld>
             <a:endParaRPr lang="ko-KR" altLang="en-US"/>
           </a:p>
@@ -881,7 +881,7 @@
           <a:p>
             <a:fld id="{0DE30E30-8A3F-4C87-9FDC-8C9A3551B329}" type="datetimeFigureOut">
               <a:rPr lang="ko-KR" altLang="en-US" smtClean="0"/>
-              <a:t>2022-05-29</a:t>
+              <a:t>2022-06-13</a:t>
             </a:fld>
             <a:endParaRPr lang="ko-KR" altLang="en-US"/>
           </a:p>
@@ -1156,7 +1156,7 @@
           <a:p>
             <a:fld id="{0DE30E30-8A3F-4C87-9FDC-8C9A3551B329}" type="datetimeFigureOut">
               <a:rPr lang="ko-KR" altLang="en-US" smtClean="0"/>
-              <a:t>2022-05-29</a:t>
+              <a:t>2022-06-13</a:t>
             </a:fld>
             <a:endParaRPr lang="ko-KR" altLang="en-US"/>
           </a:p>
@@ -1421,7 +1421,7 @@
           <a:p>
             <a:fld id="{0DE30E30-8A3F-4C87-9FDC-8C9A3551B329}" type="datetimeFigureOut">
               <a:rPr lang="ko-KR" altLang="en-US" smtClean="0"/>
-              <a:t>2022-05-29</a:t>
+              <a:t>2022-06-13</a:t>
             </a:fld>
             <a:endParaRPr lang="ko-KR" altLang="en-US"/>
           </a:p>
@@ -1833,7 +1833,7 @@
           <a:p>
             <a:fld id="{0DE30E30-8A3F-4C87-9FDC-8C9A3551B329}" type="datetimeFigureOut">
               <a:rPr lang="ko-KR" altLang="en-US" smtClean="0"/>
-              <a:t>2022-05-29</a:t>
+              <a:t>2022-06-13</a:t>
             </a:fld>
             <a:endParaRPr lang="ko-KR" altLang="en-US"/>
           </a:p>
@@ -1974,7 +1974,7 @@
           <a:p>
             <a:fld id="{0DE30E30-8A3F-4C87-9FDC-8C9A3551B329}" type="datetimeFigureOut">
               <a:rPr lang="ko-KR" altLang="en-US" smtClean="0"/>
-              <a:t>2022-05-29</a:t>
+              <a:t>2022-06-13</a:t>
             </a:fld>
             <a:endParaRPr lang="ko-KR" altLang="en-US"/>
           </a:p>
@@ -2087,7 +2087,7 @@
           <a:p>
             <a:fld id="{0DE30E30-8A3F-4C87-9FDC-8C9A3551B329}" type="datetimeFigureOut">
               <a:rPr lang="ko-KR" altLang="en-US" smtClean="0"/>
-              <a:t>2022-05-29</a:t>
+              <a:t>2022-06-13</a:t>
             </a:fld>
             <a:endParaRPr lang="ko-KR" altLang="en-US"/>
           </a:p>
@@ -2398,7 +2398,7 @@
           <a:p>
             <a:fld id="{0DE30E30-8A3F-4C87-9FDC-8C9A3551B329}" type="datetimeFigureOut">
               <a:rPr lang="ko-KR" altLang="en-US" smtClean="0"/>
-              <a:t>2022-05-29</a:t>
+              <a:t>2022-06-13</a:t>
             </a:fld>
             <a:endParaRPr lang="ko-KR" altLang="en-US"/>
           </a:p>
@@ -2686,7 +2686,7 @@
           <a:p>
             <a:fld id="{0DE30E30-8A3F-4C87-9FDC-8C9A3551B329}" type="datetimeFigureOut">
               <a:rPr lang="ko-KR" altLang="en-US" smtClean="0"/>
-              <a:t>2022-05-29</a:t>
+              <a:t>2022-06-13</a:t>
             </a:fld>
             <a:endParaRPr lang="ko-KR" altLang="en-US"/>
           </a:p>
@@ -2927,7 +2927,7 @@
           <a:p>
             <a:fld id="{0DE30E30-8A3F-4C87-9FDC-8C9A3551B329}" type="datetimeFigureOut">
               <a:rPr lang="ko-KR" altLang="en-US" smtClean="0"/>
-              <a:t>2022-05-29</a:t>
+              <a:t>2022-06-13</a:t>
             </a:fld>
             <a:endParaRPr lang="ko-KR" altLang="en-US"/>
           </a:p>
@@ -4881,7 +4881,7 @@
           <p:nvPr>
             <p:extLst>
               <p:ext uri="{D42A27DB-BD31-4B8C-83A1-F6EECF244321}">
-                <p14:modId xmlns:p14="http://schemas.microsoft.com/office/powerpoint/2010/main" val="626375015"/>
+                <p14:modId xmlns:p14="http://schemas.microsoft.com/office/powerpoint/2010/main" val="1670266868"/>
               </p:ext>
             </p:extLst>
           </p:nvPr>
@@ -5050,7 +5050,7 @@
                           <a:latin typeface="나눔스퀘어" panose="020B0600000101010101" pitchFamily="50" charset="-127"/>
                           <a:ea typeface="나눔스퀘어" panose="020B0600000101010101" pitchFamily="50" charset="-127"/>
                         </a:rPr>
-                        <a:t>2626</a:t>
+                        <a:t>3299</a:t>
                       </a:r>
                       <a:endParaRPr lang="ko-KR" altLang="en-US" dirty="0">
                         <a:latin typeface="나눔스퀘어" panose="020B0600000101010101" pitchFamily="50" charset="-127"/>
@@ -5071,7 +5071,7 @@
                           <a:latin typeface="나눔스퀘어" panose="020B0600000101010101" pitchFamily="50" charset="-127"/>
                           <a:ea typeface="나눔스퀘어" panose="020B0600000101010101" pitchFamily="50" charset="-127"/>
                         </a:rPr>
-                        <a:t>15826</a:t>
+                        <a:t>20026</a:t>
                       </a:r>
                       <a:endParaRPr lang="ko-KR" altLang="en-US" dirty="0">
                         <a:latin typeface="나눔스퀘어" panose="020B0600000101010101" pitchFamily="50" charset="-127"/>
@@ -5092,7 +5092,7 @@
                           <a:latin typeface="나눔스퀘어" panose="020B0600000101010101" pitchFamily="50" charset="-127"/>
                           <a:ea typeface="나눔스퀘어" panose="020B0600000101010101" pitchFamily="50" charset="-127"/>
                         </a:rPr>
-                        <a:t>6.0266</a:t>
+                        <a:t>6.0703</a:t>
                       </a:r>
                       <a:endParaRPr lang="ko-KR" altLang="en-US" dirty="0">
                         <a:latin typeface="나눔스퀘어" panose="020B0600000101010101" pitchFamily="50" charset="-127"/>
@@ -5141,7 +5141,7 @@
                           <a:latin typeface="나눔스퀘어" panose="020B0600000101010101" pitchFamily="50" charset="-127"/>
                           <a:ea typeface="나눔스퀘어" panose="020B0600000101010101" pitchFamily="50" charset="-127"/>
                         </a:rPr>
-                        <a:t>3633</a:t>
+                        <a:t>3809</a:t>
                       </a:r>
                       <a:endParaRPr lang="ko-KR" altLang="en-US" dirty="0">
                         <a:latin typeface="나눔스퀘어" panose="020B0600000101010101" pitchFamily="50" charset="-127"/>
@@ -5162,7 +5162,7 @@
                           <a:latin typeface="나눔스퀘어" panose="020B0600000101010101" pitchFamily="50" charset="-127"/>
                           <a:ea typeface="나눔스퀘어" panose="020B0600000101010101" pitchFamily="50" charset="-127"/>
                         </a:rPr>
-                        <a:t>21339</a:t>
+                        <a:t>21582</a:t>
                       </a:r>
                       <a:endParaRPr lang="ko-KR" altLang="en-US" dirty="0">
                         <a:latin typeface="나눔스퀘어" panose="020B0600000101010101" pitchFamily="50" charset="-127"/>
@@ -5183,7 +5183,7 @@
                           <a:latin typeface="나눔스퀘어" panose="020B0600000101010101" pitchFamily="50" charset="-127"/>
                           <a:ea typeface="나눔스퀘어" panose="020B0600000101010101" pitchFamily="50" charset="-127"/>
                         </a:rPr>
-                        <a:t>5.8736</a:t>
+                        <a:t>5.6660</a:t>
                       </a:r>
                       <a:endParaRPr lang="ko-KR" altLang="en-US" dirty="0">
                         <a:latin typeface="나눔스퀘어" panose="020B0600000101010101" pitchFamily="50" charset="-127"/>
@@ -5232,7 +5232,7 @@
                           <a:latin typeface="나눔스퀘어" panose="020B0600000101010101" pitchFamily="50" charset="-127"/>
                           <a:ea typeface="나눔스퀘어" panose="020B0600000101010101" pitchFamily="50" charset="-127"/>
                         </a:rPr>
-                        <a:t>2504</a:t>
+                        <a:t>2671</a:t>
                       </a:r>
                     </a:p>
                   </a:txBody>
@@ -5249,7 +5249,7 @@
                           <a:latin typeface="나눔스퀘어" panose="020B0600000101010101" pitchFamily="50" charset="-127"/>
                           <a:ea typeface="나눔스퀘어" panose="020B0600000101010101" pitchFamily="50" charset="-127"/>
                         </a:rPr>
-                        <a:t>15570</a:t>
+                        <a:t>15692</a:t>
                       </a:r>
                     </a:p>
                   </a:txBody>
@@ -5266,7 +5266,7 @@
                           <a:latin typeface="나눔스퀘어" panose="020B0600000101010101" pitchFamily="50" charset="-127"/>
                           <a:ea typeface="나눔스퀘어" panose="020B0600000101010101" pitchFamily="50" charset="-127"/>
                         </a:rPr>
-                        <a:t>6.2180</a:t>
+                        <a:t>5.8749</a:t>
                       </a:r>
                     </a:p>
                   </a:txBody>
@@ -5311,7 +5311,7 @@
                           <a:latin typeface="나눔스퀘어" panose="020B0600000101010101" pitchFamily="50" charset="-127"/>
                           <a:ea typeface="나눔스퀘어" panose="020B0600000101010101" pitchFamily="50" charset="-127"/>
                         </a:rPr>
-                        <a:t>2447</a:t>
+                        <a:t>2556</a:t>
                       </a:r>
                       <a:endParaRPr lang="ko-KR" altLang="en-US" dirty="0">
                         <a:latin typeface="나눔스퀘어" panose="020B0600000101010101" pitchFamily="50" charset="-127"/>
@@ -5332,7 +5332,7 @@
                           <a:latin typeface="나눔스퀘어" panose="020B0600000101010101" pitchFamily="50" charset="-127"/>
                           <a:ea typeface="나눔스퀘어" panose="020B0600000101010101" pitchFamily="50" charset="-127"/>
                         </a:rPr>
-                        <a:t>14432</a:t>
+                        <a:t>14409</a:t>
                       </a:r>
                       <a:endParaRPr lang="ko-KR" altLang="en-US" dirty="0">
                         <a:latin typeface="나눔스퀘어" panose="020B0600000101010101" pitchFamily="50" charset="-127"/>
@@ -5353,7 +5353,7 @@
                           <a:latin typeface="나눔스퀘어" panose="020B0600000101010101" pitchFamily="50" charset="-127"/>
                           <a:ea typeface="나눔스퀘어" panose="020B0600000101010101" pitchFamily="50" charset="-127"/>
                         </a:rPr>
-                        <a:t>5.8978</a:t>
+                        <a:t>5.6373</a:t>
                       </a:r>
                       <a:endParaRPr lang="ko-KR" altLang="en-US" dirty="0">
                         <a:latin typeface="나눔스퀘어" panose="020B0600000101010101" pitchFamily="50" charset="-127"/>
@@ -5402,7 +5402,7 @@
                           <a:latin typeface="나눔스퀘어" panose="020B0600000101010101" pitchFamily="50" charset="-127"/>
                           <a:ea typeface="나눔스퀘어" panose="020B0600000101010101" pitchFamily="50" charset="-127"/>
                         </a:rPr>
-                        <a:t>1433</a:t>
+                        <a:t>1503</a:t>
                       </a:r>
                       <a:endParaRPr lang="ko-KR" altLang="en-US" dirty="0">
                         <a:latin typeface="나눔스퀘어" panose="020B0600000101010101" pitchFamily="50" charset="-127"/>
@@ -5423,7 +5423,7 @@
                           <a:latin typeface="나눔스퀘어" panose="020B0600000101010101" pitchFamily="50" charset="-127"/>
                           <a:ea typeface="나눔스퀘어" panose="020B0600000101010101" pitchFamily="50" charset="-127"/>
                         </a:rPr>
-                        <a:t>8675</a:t>
+                        <a:t>8534</a:t>
                       </a:r>
                       <a:endParaRPr lang="ko-KR" altLang="en-US" dirty="0">
                         <a:latin typeface="나눔스퀘어" panose="020B0600000101010101" pitchFamily="50" charset="-127"/>
@@ -5440,11 +5440,11 @@
                     <a:p>
                       <a:pPr algn="ctr" latinLnBrk="1"/>
                       <a:r>
-                        <a:rPr lang="en-US" altLang="ko-KR" dirty="0">
+                        <a:rPr lang="en-US" altLang="ko-KR">
                           <a:latin typeface="나눔스퀘어" panose="020B0600000101010101" pitchFamily="50" charset="-127"/>
                           <a:ea typeface="나눔스퀘어" panose="020B0600000101010101" pitchFamily="50" charset="-127"/>
                         </a:rPr>
-                        <a:t>6.0537</a:t>
+                        <a:t>5.6779</a:t>
                       </a:r>
                       <a:endParaRPr lang="ko-KR" altLang="en-US" dirty="0">
                         <a:latin typeface="나눔스퀘어" panose="020B0600000101010101" pitchFamily="50" charset="-127"/>
@@ -5509,7 +5509,7 @@
                           <a:latin typeface="나눔스퀘어" panose="020B0600000101010101" pitchFamily="50" charset="-127"/>
                           <a:ea typeface="나눔스퀘어" panose="020B0600000101010101" pitchFamily="50" charset="-127"/>
                         </a:rPr>
-                        <a:t>12643</a:t>
+                        <a:t>13838</a:t>
                       </a:r>
                       <a:endParaRPr lang="ko-KR" altLang="en-US" dirty="0">
                         <a:latin typeface="나눔스퀘어" panose="020B0600000101010101" pitchFamily="50" charset="-127"/>
@@ -5530,7 +5530,7 @@
                           <a:latin typeface="나눔스퀘어" panose="020B0600000101010101" pitchFamily="50" charset="-127"/>
                           <a:ea typeface="나눔스퀘어" panose="020B0600000101010101" pitchFamily="50" charset="-127"/>
                         </a:rPr>
-                        <a:t>75,842</a:t>
+                        <a:t>80233</a:t>
                       </a:r>
                       <a:endParaRPr lang="ko-KR" altLang="en-US" dirty="0">
                         <a:latin typeface="나눔스퀘어" panose="020B0600000101010101" pitchFamily="50" charset="-127"/>
@@ -5551,7 +5551,7 @@
                           <a:latin typeface="나눔스퀘어" panose="020B0600000101010101" pitchFamily="50" charset="-127"/>
                           <a:ea typeface="나눔스퀘어" panose="020B0600000101010101" pitchFamily="50" charset="-127"/>
                         </a:rPr>
-                        <a:t>5.9987</a:t>
+                        <a:t>5.7980</a:t>
                       </a:r>
                       <a:endParaRPr lang="ko-KR" altLang="en-US" dirty="0">
                         <a:latin typeface="나눔스퀘어" panose="020B0600000101010101" pitchFamily="50" charset="-127"/>

</xml_diff>